<commit_message>
updates with multi deck
</commit_message>
<xml_diff>
--- a/RL/DDPG/pres_120219.pptx
+++ b/RL/DDPG/pres_120219.pptx
@@ -5,7 +5,7 @@
     <p:sldMasterId id="2147483648" r:id="rId1"/>
   </p:sldMasterIdLst>
   <p:notesMasterIdLst>
-    <p:notesMasterId r:id="rId14"/>
+    <p:notesMasterId r:id="rId16"/>
   </p:notesMasterIdLst>
   <p:sldIdLst>
     <p:sldId id="256" r:id="rId2"/>
@@ -19,7 +19,9 @@
     <p:sldId id="266" r:id="rId10"/>
     <p:sldId id="267" r:id="rId11"/>
     <p:sldId id="268" r:id="rId12"/>
-    <p:sldId id="269" r:id="rId13"/>
+    <p:sldId id="272" r:id="rId13"/>
+    <p:sldId id="269" r:id="rId14"/>
+    <p:sldId id="273" r:id="rId15"/>
   </p:sldIdLst>
   <p:sldSz cx="12192000" cy="6858000"/>
   <p:notesSz cx="6858000" cy="9144000"/>
@@ -208,7 +210,7 @@
           <a:p>
             <a:fld id="{1AB633A4-2E3D-7C4F-B071-8337DDA3D9DF}" type="datetimeFigureOut">
               <a:rPr lang="fr-FR" smtClean="0"/>
-              <a:t>11/02/2019</a:t>
+              <a:t>12/02/2019</a:t>
             </a:fld>
             <a:endParaRPr lang="fr-FR"/>
           </a:p>
@@ -607,7 +609,7 @@
           <a:p>
             <a:fld id="{F31286E7-5DB6-BC44-B2F7-11914ECCFB23}" type="datetimeFigureOut">
               <a:rPr lang="fr-FR" smtClean="0"/>
-              <a:t>11/02/2019</a:t>
+              <a:t>12/02/2019</a:t>
             </a:fld>
             <a:endParaRPr lang="fr-FR"/>
           </a:p>
@@ -784,7 +786,7 @@
           <a:p>
             <a:fld id="{F31286E7-5DB6-BC44-B2F7-11914ECCFB23}" type="datetimeFigureOut">
               <a:rPr lang="fr-FR" smtClean="0"/>
-              <a:t>11/02/2019</a:t>
+              <a:t>12/02/2019</a:t>
             </a:fld>
             <a:endParaRPr lang="fr-FR"/>
           </a:p>
@@ -964,7 +966,7 @@
           <a:p>
             <a:fld id="{F31286E7-5DB6-BC44-B2F7-11914ECCFB23}" type="datetimeFigureOut">
               <a:rPr lang="fr-FR" smtClean="0"/>
-              <a:t>11/02/2019</a:t>
+              <a:t>12/02/2019</a:t>
             </a:fld>
             <a:endParaRPr lang="fr-FR"/>
           </a:p>
@@ -1134,7 +1136,7 @@
           <a:p>
             <a:fld id="{F31286E7-5DB6-BC44-B2F7-11914ECCFB23}" type="datetimeFigureOut">
               <a:rPr lang="fr-FR" smtClean="0"/>
-              <a:t>11/02/2019</a:t>
+              <a:t>12/02/2019</a:t>
             </a:fld>
             <a:endParaRPr lang="fr-FR"/>
           </a:p>
@@ -1380,7 +1382,7 @@
           <a:p>
             <a:fld id="{F31286E7-5DB6-BC44-B2F7-11914ECCFB23}" type="datetimeFigureOut">
               <a:rPr lang="fr-FR" smtClean="0"/>
-              <a:t>11/02/2019</a:t>
+              <a:t>12/02/2019</a:t>
             </a:fld>
             <a:endParaRPr lang="fr-FR"/>
           </a:p>
@@ -1612,7 +1614,7 @@
           <a:p>
             <a:fld id="{F31286E7-5DB6-BC44-B2F7-11914ECCFB23}" type="datetimeFigureOut">
               <a:rPr lang="fr-FR" smtClean="0"/>
-              <a:t>11/02/2019</a:t>
+              <a:t>12/02/2019</a:t>
             </a:fld>
             <a:endParaRPr lang="fr-FR"/>
           </a:p>
@@ -1979,7 +1981,7 @@
           <a:p>
             <a:fld id="{F31286E7-5DB6-BC44-B2F7-11914ECCFB23}" type="datetimeFigureOut">
               <a:rPr lang="fr-FR" smtClean="0"/>
-              <a:t>11/02/2019</a:t>
+              <a:t>12/02/2019</a:t>
             </a:fld>
             <a:endParaRPr lang="fr-FR"/>
           </a:p>
@@ -2097,7 +2099,7 @@
           <a:p>
             <a:fld id="{F31286E7-5DB6-BC44-B2F7-11914ECCFB23}" type="datetimeFigureOut">
               <a:rPr lang="fr-FR" smtClean="0"/>
-              <a:t>11/02/2019</a:t>
+              <a:t>12/02/2019</a:t>
             </a:fld>
             <a:endParaRPr lang="fr-FR"/>
           </a:p>
@@ -2192,7 +2194,7 @@
           <a:p>
             <a:fld id="{F31286E7-5DB6-BC44-B2F7-11914ECCFB23}" type="datetimeFigureOut">
               <a:rPr lang="fr-FR" smtClean="0"/>
-              <a:t>11/02/2019</a:t>
+              <a:t>12/02/2019</a:t>
             </a:fld>
             <a:endParaRPr lang="fr-FR"/>
           </a:p>
@@ -2469,7 +2471,7 @@
           <a:p>
             <a:fld id="{F31286E7-5DB6-BC44-B2F7-11914ECCFB23}" type="datetimeFigureOut">
               <a:rPr lang="fr-FR" smtClean="0"/>
-              <a:t>11/02/2019</a:t>
+              <a:t>12/02/2019</a:t>
             </a:fld>
             <a:endParaRPr lang="fr-FR"/>
           </a:p>
@@ -2722,7 +2724,7 @@
           <a:p>
             <a:fld id="{F31286E7-5DB6-BC44-B2F7-11914ECCFB23}" type="datetimeFigureOut">
               <a:rPr lang="fr-FR" smtClean="0"/>
-              <a:t>11/02/2019</a:t>
+              <a:t>12/02/2019</a:t>
             </a:fld>
             <a:endParaRPr lang="fr-FR"/>
           </a:p>
@@ -2935,7 +2937,7 @@
           <a:p>
             <a:fld id="{F31286E7-5DB6-BC44-B2F7-11914ECCFB23}" type="datetimeFigureOut">
               <a:rPr lang="fr-FR" smtClean="0"/>
-              <a:t>11/02/2019</a:t>
+              <a:t>12/02/2019</a:t>
             </a:fld>
             <a:endParaRPr lang="fr-FR"/>
           </a:p>
@@ -3395,11 +3397,7 @@
           <a:p>
             <a:r>
               <a:rPr lang="fr-FR" dirty="0" smtClean="0"/>
-              <a:t>12/02/19 - Etienne </a:t>
-            </a:r>
-            <a:r>
-              <a:rPr lang="fr-FR" dirty="0" smtClean="0"/>
-              <a:t>Dupont</a:t>
+              <a:t>12/02/19 - Etienne Dupont</a:t>
             </a:r>
             <a:endParaRPr lang="fr-FR" dirty="0"/>
           </a:p>
@@ -3459,15 +3457,7 @@
           <a:p>
             <a:r>
               <a:rPr lang="fr-FR" dirty="0" smtClean="0"/>
-              <a:t>Deuxième </a:t>
-            </a:r>
-            <a:r>
-              <a:rPr lang="fr-FR" dirty="0" smtClean="0"/>
-              <a:t>expérience : </a:t>
-            </a:r>
-            <a:r>
-              <a:rPr lang="fr-FR" dirty="0" smtClean="0"/>
-              <a:t>Q* plugin</a:t>
+              <a:t>Deuxième expérience : Q* plugin</a:t>
             </a:r>
             <a:endParaRPr lang="fr-FR" dirty="0"/>
           </a:p>
@@ -3497,7 +3487,27 @@
           <a:p>
             <a:r>
               <a:rPr lang="fr-FR" dirty="0" smtClean="0"/>
-              <a:t>On commence par entraîner le </a:t>
+              <a:t>Dans </a:t>
+            </a:r>
+            <a:r>
+              <a:rPr lang="fr-FR" dirty="0" smtClean="0"/>
+              <a:t>notre DDPG </a:t>
+            </a:r>
+            <a:r>
+              <a:rPr lang="fr-FR" dirty="0" smtClean="0"/>
+              <a:t>off </a:t>
+            </a:r>
+            <a:r>
+              <a:rPr lang="fr-FR" dirty="0" err="1" smtClean="0"/>
+              <a:t>policy</a:t>
+            </a:r>
+            <a:r>
+              <a:rPr lang="fr-FR" dirty="0" smtClean="0"/>
+              <a:t>, </a:t>
+            </a:r>
+            <a:r>
+              <a:rPr lang="fr-FR" dirty="0" smtClean="0"/>
+              <a:t>on supprime le </a:t>
             </a:r>
             <a:r>
               <a:rPr lang="fr-FR" dirty="0" err="1" smtClean="0"/>
@@ -3505,22 +3515,19 @@
             </a:r>
             <a:r>
               <a:rPr lang="fr-FR" dirty="0" smtClean="0"/>
-              <a:t> sur DDPG classique et on output la Q-valeur optimale obtenue, Q*.  </a:t>
-            </a:r>
-          </a:p>
-          <a:p>
-            <a:r>
-              <a:rPr lang="fr-FR" dirty="0" smtClean="0"/>
-              <a:t>Dans notre DDPG de test, on supprime le </a:t>
-            </a:r>
-            <a:r>
-              <a:rPr lang="fr-FR" dirty="0" err="1" smtClean="0"/>
-              <a:t>critic</a:t>
-            </a:r>
-            <a:r>
-              <a:rPr lang="fr-FR" dirty="0" smtClean="0"/>
-              <a:t> et on le remplace par Q*, qu’on n’entraîne plus.</a:t>
-            </a:r>
+              <a:t> et on le remplace par </a:t>
+            </a:r>
+            <a:r>
+              <a:rPr lang="fr-FR" dirty="0" smtClean="0"/>
+              <a:t>Q* (obtenue par DDPG classique)</a:t>
+            </a:r>
+          </a:p>
+          <a:p>
+            <a:r>
+              <a:rPr lang="fr-FR" b="1" dirty="0" smtClean="0"/>
+              <a:t>On n’entraîne plus Q*.</a:t>
+            </a:r>
+            <a:endParaRPr lang="fr-FR" b="1" dirty="0" smtClean="0"/>
           </a:p>
           <a:p>
             <a:r>
@@ -3563,6 +3570,20 @@
               <a:buChar char="Þ"/>
             </a:pPr>
             <a:endParaRPr lang="fr-FR" dirty="0"/>
+          </a:p>
+          <a:p>
+            <a:pPr>
+              <a:buFont typeface="Symbol" charset="2"/>
+              <a:buChar char="Þ"/>
+            </a:pPr>
+            <a:endParaRPr lang="fr-FR" dirty="0"/>
+          </a:p>
+          <a:p>
+            <a:pPr>
+              <a:buFont typeface="Symbol" charset="2"/>
+              <a:buChar char="Þ"/>
+            </a:pPr>
+            <a:endParaRPr lang="fr-FR" dirty="0" smtClean="0"/>
           </a:p>
           <a:p>
             <a:pPr>
@@ -3616,7 +3637,7 @@
         </p:blipFill>
         <p:spPr>
           <a:xfrm>
-            <a:off x="3331367" y="2739683"/>
+            <a:off x="3331367" y="3091376"/>
             <a:ext cx="4190323" cy="1800000"/>
           </a:xfrm>
           <a:prstGeom prst="rect">
@@ -3708,17 +3729,37 @@
           <a:p>
             <a:r>
               <a:rPr lang="fr-FR" dirty="0" smtClean="0"/>
-              <a:t>Deuxième </a:t>
-            </a:r>
-            <a:r>
-              <a:rPr lang="fr-FR" dirty="0" smtClean="0"/>
-              <a:t>expérience : </a:t>
-            </a:r>
-            <a:r>
-              <a:rPr lang="fr-FR" dirty="0" smtClean="0"/>
-              <a:t>Q* plugin</a:t>
+              <a:t>Deuxième expérience : Q* plugin</a:t>
             </a:r>
             <a:endParaRPr lang="fr-FR" dirty="0"/>
+          </a:p>
+        </p:txBody>
+      </p:sp>
+      <p:sp>
+        <p:nvSpPr>
+          <p:cNvPr id="4" name="Espace réservé du contenu 2"/>
+          <p:cNvSpPr>
+            <a:spLocks noGrp="1"/>
+          </p:cNvSpPr>
+          <p:nvPr>
+            <p:ph idx="1"/>
+          </p:nvPr>
+        </p:nvSpPr>
+        <p:spPr>
+          <a:xfrm>
+            <a:off x="168729" y="894896"/>
+            <a:ext cx="10515600" cy="4351338"/>
+          </a:xfrm>
+        </p:spPr>
+        <p:txBody>
+          <a:bodyPr/>
+          <a:lstStyle/>
+          <a:p>
+            <a:r>
+              <a:rPr lang="fr-FR" dirty="0" smtClean="0"/>
+              <a:t>Premières tentatives</a:t>
+            </a:r>
+            <a:endParaRPr lang="fr-FR" dirty="0" smtClean="0"/>
           </a:p>
         </p:txBody>
       </p:sp>
@@ -3759,6 +3800,36 @@
           <a:chExt cx="0" cy="0"/>
         </a:xfrm>
       </p:grpSpPr>
+      <p:pic>
+        <p:nvPicPr>
+          <p:cNvPr id="3" name="Image 2"/>
+          <p:cNvPicPr>
+            <a:picLocks noChangeAspect="1"/>
+          </p:cNvPicPr>
+          <p:nvPr/>
+        </p:nvPicPr>
+        <p:blipFill>
+          <a:blip r:embed="rId2">
+            <a:extLst>
+              <a:ext uri="{28A0092B-C50C-407E-A947-70E740481C1C}">
+                <a14:useLocalDpi xmlns:a14="http://schemas.microsoft.com/office/drawing/2010/main" val="0"/>
+              </a:ext>
+            </a:extLst>
+          </a:blip>
+          <a:stretch>
+            <a:fillRect/>
+          </a:stretch>
+        </p:blipFill>
+        <p:spPr>
+          <a:xfrm>
+            <a:off x="2632373" y="1231327"/>
+            <a:ext cx="7066800" cy="5300100"/>
+          </a:xfrm>
+          <a:prstGeom prst="rect">
+            <a:avLst/>
+          </a:prstGeom>
+        </p:spPr>
+      </p:pic>
       <p:sp>
         <p:nvSpPr>
           <p:cNvPr id="2" name="Titre 1"/>
@@ -3776,15 +3847,7 @@
           <a:p>
             <a:r>
               <a:rPr lang="fr-FR" dirty="0" smtClean="0"/>
-              <a:t>Deuxième </a:t>
-            </a:r>
-            <a:r>
-              <a:rPr lang="fr-FR" dirty="0" smtClean="0"/>
-              <a:t>expérience : </a:t>
-            </a:r>
-            <a:r>
-              <a:rPr lang="fr-FR" dirty="0" smtClean="0"/>
-              <a:t>Q* plugin</a:t>
+              <a:t>Deuxième expérience : Q* plugin</a:t>
             </a:r>
             <a:endParaRPr lang="fr-FR" dirty="0"/>
           </a:p>
@@ -3792,7 +3855,7 @@
       </p:sp>
       <p:sp>
         <p:nvSpPr>
-          <p:cNvPr id="3" name="Espace réservé du contenu 2"/>
+          <p:cNvPr id="4" name="Espace réservé du contenu 2"/>
           <p:cNvSpPr>
             <a:spLocks noGrp="1"/>
           </p:cNvSpPr>
@@ -3800,98 +3863,32 @@
             <p:ph idx="1"/>
           </p:nvPr>
         </p:nvSpPr>
-        <p:spPr/>
-        <p:txBody>
-          <a:bodyPr/>
-          <a:lstStyle/>
-          <a:p>
-            <a:r>
-              <a:rPr lang="fr-FR" dirty="0" smtClean="0"/>
-              <a:t>On commence par entraîner le </a:t>
-            </a:r>
-            <a:r>
-              <a:rPr lang="fr-FR" dirty="0" err="1" smtClean="0"/>
-              <a:t>critic</a:t>
-            </a:r>
-            <a:r>
-              <a:rPr lang="fr-FR" dirty="0" smtClean="0"/>
-              <a:t> sur DDPG classique et on output la Q-valeur optimale obtenue, Q*.  </a:t>
-            </a:r>
-          </a:p>
-          <a:p>
-            <a:r>
-              <a:rPr lang="fr-FR" dirty="0" smtClean="0"/>
-              <a:t>Dans notre DDPG de test, on supprime le </a:t>
-            </a:r>
-            <a:r>
-              <a:rPr lang="fr-FR" dirty="0" err="1" smtClean="0"/>
-              <a:t>critic</a:t>
-            </a:r>
-            <a:r>
-              <a:rPr lang="fr-FR" dirty="0" smtClean="0"/>
-              <a:t> et on le remplace par Q*, qu’on n’entraîne plus.</a:t>
-            </a:r>
-          </a:p>
-          <a:p>
-            <a:r>
-              <a:rPr lang="fr-FR" dirty="0" smtClean="0"/>
-              <a:t>Le </a:t>
-            </a:r>
-            <a:r>
-              <a:rPr lang="fr-FR" dirty="0" err="1" smtClean="0"/>
-              <a:t>Deterministic</a:t>
-            </a:r>
-            <a:r>
-              <a:rPr lang="fr-FR" dirty="0" smtClean="0"/>
-              <a:t> Policy Gradient se fait alors systématiquement avec Q*.</a:t>
-            </a:r>
-          </a:p>
-          <a:p>
-            <a:pPr>
-              <a:buFont typeface="Symbol" charset="2"/>
-              <a:buChar char="Þ"/>
-            </a:pPr>
+        <p:spPr>
+          <a:xfrm>
+            <a:off x="168729" y="894896"/>
+            <a:ext cx="10515600" cy="4351338"/>
+          </a:xfrm>
+        </p:spPr>
+        <p:txBody>
+          <a:bodyPr/>
+          <a:lstStyle/>
+          <a:p>
+            <a:r>
+              <a:rPr lang="fr-FR" dirty="0" smtClean="0"/>
+              <a:t>Deuxième tentative : bruit d’exploration nul, plus </a:t>
+            </a:r>
+            <a:r>
+              <a:rPr lang="fr-FR" dirty="0" smtClean="0"/>
+              <a:t>de temps d’entraînement</a:t>
+            </a:r>
             <a:endParaRPr lang="fr-FR" dirty="0" smtClean="0"/>
-          </a:p>
-          <a:p>
-            <a:pPr>
-              <a:buFont typeface="Symbol" charset="2"/>
-              <a:buChar char="Þ"/>
-            </a:pPr>
-            <a:r>
-              <a:rPr lang="fr-FR" dirty="0" smtClean="0"/>
-              <a:t> Est-ce que la politique converge vers une politique optimale?</a:t>
-            </a:r>
-          </a:p>
-          <a:p>
-            <a:pPr marL="0" indent="0">
-              <a:buNone/>
-            </a:pPr>
-            <a:r>
-              <a:rPr lang="fr-FR" b="1" dirty="0" smtClean="0">
-                <a:solidFill>
-                  <a:srgbClr val="FF0000"/>
-                </a:solidFill>
-              </a:rPr>
-              <a:t>Il semble que non!</a:t>
-            </a:r>
-          </a:p>
-          <a:p>
-            <a:pPr>
-              <a:buFont typeface="Symbol" charset="2"/>
-              <a:buChar char="Þ"/>
-            </a:pPr>
-            <a:endParaRPr lang="fr-FR" dirty="0" smtClean="0"/>
-          </a:p>
-          <a:p>
-            <a:endParaRPr lang="fr-FR" dirty="0"/>
           </a:p>
         </p:txBody>
       </p:sp>
     </p:spTree>
     <p:extLst>
       <p:ext uri="{BB962C8B-B14F-4D97-AF65-F5344CB8AC3E}">
-        <p14:creationId xmlns:p14="http://schemas.microsoft.com/office/powerpoint/2010/main" val="520062318"/>
+        <p14:creationId xmlns:p14="http://schemas.microsoft.com/office/powerpoint/2010/main" val="668795080"/>
       </p:ext>
     </p:extLst>
   </p:cSld>
@@ -3908,7 +3905,7 @@
 </p:sld>
 </file>
 
-<file path=ppt/slides/slide2.xml><?xml version="1.0" encoding="utf-8"?>
+<file path=ppt/slides/slide13.xml><?xml version="1.0" encoding="utf-8"?>
 <p:sld xmlns:a="http://schemas.openxmlformats.org/drawingml/2006/main" xmlns:r="http://schemas.openxmlformats.org/officeDocument/2006/relationships" xmlns:p="http://schemas.openxmlformats.org/presentationml/2006/main">
   <p:cSld>
     <p:spTree>
@@ -3942,7 +3939,7 @@
           <a:p>
             <a:r>
               <a:rPr lang="fr-FR" dirty="0" smtClean="0"/>
-              <a:t>Introduction</a:t>
+              <a:t>Deuxième expérience : Q* plugin</a:t>
             </a:r>
             <a:endParaRPr lang="fr-FR" dirty="0"/>
           </a:p>
@@ -3950,335 +3947,16 @@
       </p:sp>
       <p:sp>
         <p:nvSpPr>
-          <p:cNvPr id="3" name="Espace réservé du contenu 2"/>
-          <p:cNvSpPr>
-            <a:spLocks noGrp="1"/>
-          </p:cNvSpPr>
-          <p:nvPr>
-            <p:ph idx="1"/>
-          </p:nvPr>
+          <p:cNvPr id="4" name="Espace réservé du contenu 2"/>
+          <p:cNvSpPr txBox="1">
+            <a:spLocks/>
+          </p:cNvSpPr>
+          <p:nvPr/>
         </p:nvSpPr>
         <p:spPr>
           <a:xfrm>
             <a:off x="168729" y="894896"/>
-            <a:ext cx="10515600" cy="483169"/>
-          </a:xfrm>
-        </p:spPr>
-        <p:txBody>
-          <a:bodyPr/>
-          <a:lstStyle/>
-          <a:p>
-            <a:r>
-              <a:rPr lang="fr-FR" smtClean="0"/>
-              <a:t>Expérience </a:t>
-            </a:r>
-            <a:r>
-              <a:rPr lang="fr-FR" dirty="0" smtClean="0"/>
-              <a:t>:</a:t>
-            </a:r>
-          </a:p>
-        </p:txBody>
-      </p:sp>
-      <p:pic>
-        <p:nvPicPr>
-          <p:cNvPr id="5" name="Image 4"/>
-          <p:cNvPicPr>
-            <a:picLocks noChangeAspect="1"/>
-          </p:cNvPicPr>
-          <p:nvPr/>
-        </p:nvPicPr>
-        <p:blipFill>
-          <a:blip r:embed="rId2"/>
-          <a:stretch>
-            <a:fillRect/>
-          </a:stretch>
-        </p:blipFill>
-        <p:spPr>
-          <a:xfrm>
-            <a:off x="4385130" y="1475626"/>
-            <a:ext cx="4069565" cy="1800000"/>
-          </a:xfrm>
-          <a:prstGeom prst="rect">
-            <a:avLst/>
-          </a:prstGeom>
-        </p:spPr>
-      </p:pic>
-      <p:pic>
-        <p:nvPicPr>
-          <p:cNvPr id="7" name="Image 6"/>
-          <p:cNvPicPr>
-            <a:picLocks noChangeAspect="1"/>
-          </p:cNvPicPr>
-          <p:nvPr/>
-        </p:nvPicPr>
-        <p:blipFill>
-          <a:blip r:embed="rId3"/>
-          <a:stretch>
-            <a:fillRect/>
-          </a:stretch>
-        </p:blipFill>
-        <p:spPr>
-          <a:xfrm>
-            <a:off x="4385130" y="4346234"/>
-            <a:ext cx="4190323" cy="1800000"/>
-          </a:xfrm>
-          <a:prstGeom prst="rect">
-            <a:avLst/>
-          </a:prstGeom>
-        </p:spPr>
-      </p:pic>
-      <p:sp>
-        <p:nvSpPr>
-          <p:cNvPr id="8" name="ZoneTexte 7"/>
-          <p:cNvSpPr txBox="1"/>
-          <p:nvPr/>
-        </p:nvSpPr>
-        <p:spPr>
-          <a:xfrm>
-            <a:off x="1409694" y="2052461"/>
-            <a:ext cx="1612621" cy="646331"/>
-          </a:xfrm>
-          <a:prstGeom prst="rect">
-            <a:avLst/>
-          </a:prstGeom>
-          <a:noFill/>
-        </p:spPr>
-        <p:txBody>
-          <a:bodyPr wrap="none" rtlCol="0">
-            <a:spAutoFit/>
-          </a:bodyPr>
-          <a:lstStyle/>
-          <a:p>
-            <a:r>
-              <a:rPr lang="fr-FR" dirty="0" smtClean="0"/>
-              <a:t>DDPG standard</a:t>
-            </a:r>
-          </a:p>
-          <a:p>
-            <a:r>
-              <a:rPr lang="fr-FR" dirty="0" smtClean="0"/>
-              <a:t>« on </a:t>
-            </a:r>
-            <a:r>
-              <a:rPr lang="fr-FR" dirty="0" err="1" smtClean="0"/>
-              <a:t>policy</a:t>
-            </a:r>
-            <a:r>
-              <a:rPr lang="fr-FR" dirty="0" smtClean="0"/>
-              <a:t> » </a:t>
-            </a:r>
-            <a:endParaRPr lang="fr-FR" dirty="0"/>
-          </a:p>
-        </p:txBody>
-      </p:sp>
-      <p:sp>
-        <p:nvSpPr>
-          <p:cNvPr id="9" name="ZoneTexte 8"/>
-          <p:cNvSpPr txBox="1"/>
-          <p:nvPr/>
-        </p:nvSpPr>
-        <p:spPr>
-          <a:xfrm>
-            <a:off x="1409693" y="5061568"/>
-            <a:ext cx="1717073" cy="369332"/>
-          </a:xfrm>
-          <a:prstGeom prst="rect">
-            <a:avLst/>
-          </a:prstGeom>
-          <a:noFill/>
-        </p:spPr>
-        <p:txBody>
-          <a:bodyPr wrap="none" rtlCol="0">
-            <a:spAutoFit/>
-          </a:bodyPr>
-          <a:lstStyle/>
-          <a:p>
-            <a:r>
-              <a:rPr lang="fr-FR" dirty="0" smtClean="0"/>
-              <a:t>DDPG off-</a:t>
-            </a:r>
-            <a:r>
-              <a:rPr lang="fr-FR" dirty="0" err="1" smtClean="0"/>
-              <a:t>policy</a:t>
-            </a:r>
-            <a:r>
-              <a:rPr lang="fr-FR" dirty="0" smtClean="0"/>
-              <a:t> </a:t>
-            </a:r>
-            <a:endParaRPr lang="fr-FR" dirty="0"/>
-          </a:p>
-        </p:txBody>
-      </p:sp>
-      <p:cxnSp>
-        <p:nvCxnSpPr>
-          <p:cNvPr id="11" name="Connecteur droit 10"/>
-          <p:cNvCxnSpPr/>
-          <p:nvPr/>
-        </p:nvCxnSpPr>
-        <p:spPr>
-          <a:xfrm flipV="1">
-            <a:off x="653142" y="3708184"/>
-            <a:ext cx="11136086" cy="65314"/>
-          </a:xfrm>
-          <a:prstGeom prst="line">
-            <a:avLst/>
-          </a:prstGeom>
-          <a:ln>
-            <a:solidFill>
-              <a:schemeClr val="tx1"/>
-            </a:solidFill>
-            <a:prstDash val="sysDash"/>
-          </a:ln>
-        </p:spPr>
-        <p:style>
-          <a:lnRef idx="1">
-            <a:schemeClr val="accent1"/>
-          </a:lnRef>
-          <a:fillRef idx="0">
-            <a:schemeClr val="accent1"/>
-          </a:fillRef>
-          <a:effectRef idx="0">
-            <a:schemeClr val="accent1"/>
-          </a:effectRef>
-          <a:fontRef idx="minor">
-            <a:schemeClr val="tx1"/>
-          </a:fontRef>
-        </p:style>
-      </p:cxnSp>
-    </p:spTree>
-    <p:extLst>
-      <p:ext uri="{BB962C8B-B14F-4D97-AF65-F5344CB8AC3E}">
-        <p14:creationId xmlns:p14="http://schemas.microsoft.com/office/powerpoint/2010/main" val="577158550"/>
-      </p:ext>
-    </p:extLst>
-  </p:cSld>
-  <p:clrMapOvr>
-    <a:masterClrMapping/>
-  </p:clrMapOvr>
-  <p:timing>
-    <p:tnLst>
-      <p:par>
-        <p:cTn id="1" dur="indefinite" restart="never" nodeType="tmRoot"/>
-      </p:par>
-    </p:tnLst>
-  </p:timing>
-</p:sld>
-</file>
-
-<file path=ppt/slides/slide3.xml><?xml version="1.0" encoding="utf-8"?>
-<p:sld xmlns:a="http://schemas.openxmlformats.org/drawingml/2006/main" xmlns:r="http://schemas.openxmlformats.org/officeDocument/2006/relationships" xmlns:p="http://schemas.openxmlformats.org/presentationml/2006/main">
-  <p:cSld>
-    <p:spTree>
-      <p:nvGrpSpPr>
-        <p:cNvPr id="1" name=""/>
-        <p:cNvGrpSpPr/>
-        <p:nvPr/>
-      </p:nvGrpSpPr>
-      <p:grpSpPr>
-        <a:xfrm>
-          <a:off x="0" y="0"/>
-          <a:ext cx="0" cy="0"/>
-          <a:chOff x="0" y="0"/>
-          <a:chExt cx="0" cy="0"/>
-        </a:xfrm>
-      </p:grpSpPr>
-      <p:sp>
-        <p:nvSpPr>
-          <p:cNvPr id="2" name="Titre 1"/>
-          <p:cNvSpPr>
-            <a:spLocks noGrp="1"/>
-          </p:cNvSpPr>
-          <p:nvPr>
-            <p:ph type="title"/>
-          </p:nvPr>
-        </p:nvSpPr>
-        <p:spPr/>
-        <p:txBody>
-          <a:bodyPr/>
-          <a:lstStyle/>
-          <a:p>
-            <a:r>
-              <a:rPr lang="fr-FR" dirty="0" smtClean="0"/>
-              <a:t>Introduction</a:t>
-            </a:r>
-            <a:endParaRPr lang="fr-FR" dirty="0"/>
-          </a:p>
-        </p:txBody>
-      </p:sp>
-      <p:pic>
-        <p:nvPicPr>
-          <p:cNvPr id="7" name="Image 6"/>
-          <p:cNvPicPr>
-            <a:picLocks noChangeAspect="1"/>
-          </p:cNvPicPr>
-          <p:nvPr/>
-        </p:nvPicPr>
-        <p:blipFill>
-          <a:blip r:embed="rId2"/>
-          <a:stretch>
-            <a:fillRect/>
-          </a:stretch>
-        </p:blipFill>
-        <p:spPr>
-          <a:xfrm>
-            <a:off x="4336145" y="1378065"/>
-            <a:ext cx="4190323" cy="1800000"/>
-          </a:xfrm>
-          <a:prstGeom prst="rect">
-            <a:avLst/>
-          </a:prstGeom>
-        </p:spPr>
-      </p:pic>
-      <p:sp>
-        <p:nvSpPr>
-          <p:cNvPr id="9" name="ZoneTexte 8"/>
-          <p:cNvSpPr txBox="1"/>
-          <p:nvPr/>
-        </p:nvSpPr>
-        <p:spPr>
-          <a:xfrm>
-            <a:off x="1360708" y="2093399"/>
-            <a:ext cx="1717073" cy="369332"/>
-          </a:xfrm>
-          <a:prstGeom prst="rect">
-            <a:avLst/>
-          </a:prstGeom>
-          <a:noFill/>
-        </p:spPr>
-        <p:txBody>
-          <a:bodyPr wrap="none" rtlCol="0">
-            <a:spAutoFit/>
-          </a:bodyPr>
-          <a:lstStyle/>
-          <a:p>
-            <a:r>
-              <a:rPr lang="fr-FR" dirty="0" smtClean="0"/>
-              <a:t>DDPG off-</a:t>
-            </a:r>
-            <a:r>
-              <a:rPr lang="fr-FR" dirty="0" err="1" smtClean="0"/>
-              <a:t>policy</a:t>
-            </a:r>
-            <a:r>
-              <a:rPr lang="fr-FR" dirty="0" smtClean="0"/>
-              <a:t> </a:t>
-            </a:r>
-            <a:endParaRPr lang="fr-FR" dirty="0"/>
-          </a:p>
-        </p:txBody>
-      </p:sp>
-      <p:sp>
-        <p:nvSpPr>
-          <p:cNvPr id="10" name="Espace réservé du contenu 2"/>
-          <p:cNvSpPr txBox="1">
-            <a:spLocks/>
-          </p:cNvSpPr>
-          <p:nvPr/>
-        </p:nvSpPr>
-        <p:spPr>
-          <a:xfrm>
-            <a:off x="674915" y="3837672"/>
-            <a:ext cx="10515600" cy="1813353"/>
+            <a:ext cx="10515600" cy="5489576"/>
           </a:xfrm>
           <a:prstGeom prst="rect">
             <a:avLst/>
@@ -4453,6 +4131,848 @@
             </a:lvl9pPr>
           </a:lstStyle>
           <a:p>
+            <a:r>
+              <a:rPr lang="fr-FR" dirty="0" smtClean="0"/>
+              <a:t>Dans notre DDPG off </a:t>
+            </a:r>
+            <a:r>
+              <a:rPr lang="fr-FR" dirty="0" err="1" smtClean="0"/>
+              <a:t>policy</a:t>
+            </a:r>
+            <a:r>
+              <a:rPr lang="fr-FR" dirty="0" smtClean="0"/>
+              <a:t>, on supprime le </a:t>
+            </a:r>
+            <a:r>
+              <a:rPr lang="fr-FR" dirty="0" err="1" smtClean="0"/>
+              <a:t>critic</a:t>
+            </a:r>
+            <a:r>
+              <a:rPr lang="fr-FR" dirty="0" smtClean="0"/>
+              <a:t> et on le remplace par Q* (obtenue par DDPG classique)</a:t>
+            </a:r>
+          </a:p>
+          <a:p>
+            <a:r>
+              <a:rPr lang="fr-FR" b="1" dirty="0" smtClean="0"/>
+              <a:t>On n’entraîne plus Q*.</a:t>
+            </a:r>
+          </a:p>
+          <a:p>
+            <a:r>
+              <a:rPr lang="fr-FR" dirty="0" smtClean="0"/>
+              <a:t>Le </a:t>
+            </a:r>
+            <a:r>
+              <a:rPr lang="fr-FR" dirty="0" err="1" smtClean="0"/>
+              <a:t>Deterministic</a:t>
+            </a:r>
+            <a:r>
+              <a:rPr lang="fr-FR" dirty="0" smtClean="0"/>
+              <a:t> Policy Gradient se fait alors systématiquement avec Q*.</a:t>
+            </a:r>
+          </a:p>
+          <a:p>
+            <a:pPr>
+              <a:buFont typeface="Symbol" charset="2"/>
+              <a:buChar char="Þ"/>
+            </a:pPr>
+            <a:endParaRPr lang="fr-FR" dirty="0" smtClean="0"/>
+          </a:p>
+          <a:p>
+            <a:pPr>
+              <a:buFont typeface="Symbol" charset="2"/>
+              <a:buChar char="Þ"/>
+            </a:pPr>
+            <a:r>
+              <a:rPr lang="fr-FR" dirty="0" smtClean="0"/>
+              <a:t>Est-ce que la politique converge vers une politique optimale?</a:t>
+            </a:r>
+          </a:p>
+          <a:p>
+            <a:pPr marL="0" indent="0">
+              <a:buNone/>
+            </a:pPr>
+            <a:r>
+              <a:rPr lang="fr-FR" b="1" dirty="0">
+                <a:solidFill>
+                  <a:srgbClr val="FF0000"/>
+                </a:solidFill>
+              </a:rPr>
+              <a:t>Oui! Mais « lentement »</a:t>
+            </a:r>
+          </a:p>
+          <a:p>
+            <a:pPr marL="0" indent="0">
+              <a:buNone/>
+            </a:pPr>
+            <a:endParaRPr lang="fr-FR" b="1" dirty="0">
+              <a:solidFill>
+                <a:srgbClr val="FF0000"/>
+              </a:solidFill>
+            </a:endParaRPr>
+          </a:p>
+          <a:p>
+            <a:pPr marL="0" indent="0">
+              <a:buNone/>
+            </a:pPr>
+            <a:r>
+              <a:rPr lang="fr-FR" dirty="0">
+                <a:solidFill>
+                  <a:srgbClr val="FF0000"/>
+                </a:solidFill>
+              </a:rPr>
+              <a:t>Pourquoi? </a:t>
+            </a:r>
+          </a:p>
+          <a:p>
+            <a:pPr marL="0" indent="0">
+              <a:buNone/>
+            </a:pPr>
+            <a:r>
+              <a:rPr lang="fr-FR" dirty="0">
+                <a:solidFill>
+                  <a:srgbClr val="FF0000"/>
+                </a:solidFill>
+              </a:rPr>
+              <a:t>- Convergence continue vers la politique optimale sans se soucier des états intermédiaires, car off-</a:t>
+            </a:r>
+            <a:r>
+              <a:rPr lang="fr-FR" dirty="0" err="1">
+                <a:solidFill>
+                  <a:srgbClr val="FF0000"/>
+                </a:solidFill>
+              </a:rPr>
+              <a:t>policy</a:t>
+            </a:r>
+            <a:endParaRPr lang="fr-FR" dirty="0">
+              <a:solidFill>
+                <a:srgbClr val="FF0000"/>
+              </a:solidFill>
+            </a:endParaRPr>
+          </a:p>
+          <a:p>
+            <a:pPr marL="0" indent="0">
+              <a:buNone/>
+            </a:pPr>
+            <a:endParaRPr lang="fr-FR" dirty="0" smtClean="0"/>
+          </a:p>
+          <a:p>
+            <a:endParaRPr lang="fr-FR" dirty="0"/>
+          </a:p>
+        </p:txBody>
+      </p:sp>
+    </p:spTree>
+    <p:extLst>
+      <p:ext uri="{BB962C8B-B14F-4D97-AF65-F5344CB8AC3E}">
+        <p14:creationId xmlns:p14="http://schemas.microsoft.com/office/powerpoint/2010/main" val="520062318"/>
+      </p:ext>
+    </p:extLst>
+  </p:cSld>
+  <p:clrMapOvr>
+    <a:masterClrMapping/>
+  </p:clrMapOvr>
+  <p:timing>
+    <p:tnLst>
+      <p:par>
+        <p:cTn id="1" dur="indefinite" restart="never" nodeType="tmRoot"/>
+      </p:par>
+    </p:tnLst>
+  </p:timing>
+</p:sld>
+</file>
+
+<file path=ppt/slides/slide14.xml><?xml version="1.0" encoding="utf-8"?>
+<p:sld xmlns:a="http://schemas.openxmlformats.org/drawingml/2006/main" xmlns:r="http://schemas.openxmlformats.org/officeDocument/2006/relationships" xmlns:p="http://schemas.openxmlformats.org/presentationml/2006/main">
+  <p:cSld>
+    <p:spTree>
+      <p:nvGrpSpPr>
+        <p:cNvPr id="1" name=""/>
+        <p:cNvGrpSpPr/>
+        <p:nvPr/>
+      </p:nvGrpSpPr>
+      <p:grpSpPr>
+        <a:xfrm>
+          <a:off x="0" y="0"/>
+          <a:ext cx="0" cy="0"/>
+          <a:chOff x="0" y="0"/>
+          <a:chExt cx="0" cy="0"/>
+        </a:xfrm>
+      </p:grpSpPr>
+      <p:sp>
+        <p:nvSpPr>
+          <p:cNvPr id="2" name="Titre 1"/>
+          <p:cNvSpPr>
+            <a:spLocks noGrp="1"/>
+          </p:cNvSpPr>
+          <p:nvPr>
+            <p:ph type="title"/>
+          </p:nvPr>
+        </p:nvSpPr>
+        <p:spPr/>
+        <p:txBody>
+          <a:bodyPr/>
+          <a:lstStyle/>
+          <a:p>
+            <a:r>
+              <a:rPr lang="fr-FR" dirty="0" smtClean="0"/>
+              <a:t>Conclusion</a:t>
+            </a:r>
+            <a:endParaRPr lang="fr-FR" dirty="0"/>
+          </a:p>
+        </p:txBody>
+      </p:sp>
+      <p:sp>
+        <p:nvSpPr>
+          <p:cNvPr id="3" name="Espace réservé du contenu 2"/>
+          <p:cNvSpPr>
+            <a:spLocks noGrp="1"/>
+          </p:cNvSpPr>
+          <p:nvPr>
+            <p:ph idx="1"/>
+          </p:nvPr>
+        </p:nvSpPr>
+        <p:spPr/>
+        <p:txBody>
+          <a:bodyPr/>
+          <a:lstStyle/>
+          <a:p>
+            <a:pPr marL="0" indent="0">
+              <a:buNone/>
+            </a:pPr>
+            <a:r>
+              <a:rPr lang="fr-FR" dirty="0" smtClean="0"/>
+              <a:t>Les questions laissées en suspend : </a:t>
+            </a:r>
+          </a:p>
+          <a:p>
+            <a:r>
+              <a:rPr lang="fr-FR" dirty="0" smtClean="0"/>
+              <a:t>Pourquoi le </a:t>
+            </a:r>
+            <a:r>
+              <a:rPr lang="fr-FR" dirty="0" err="1" smtClean="0"/>
+              <a:t>sampling</a:t>
+            </a:r>
+            <a:r>
+              <a:rPr lang="fr-FR" dirty="0" smtClean="0"/>
+              <a:t> « </a:t>
+            </a:r>
+            <a:r>
+              <a:rPr lang="fr-FR" dirty="0" err="1" smtClean="0"/>
+              <a:t>random</a:t>
+            </a:r>
+            <a:r>
+              <a:rPr lang="fr-FR" dirty="0" smtClean="0"/>
+              <a:t> » permet quand même l’apprentissage?</a:t>
+            </a:r>
+          </a:p>
+          <a:p>
+            <a:r>
+              <a:rPr lang="fr-FR" dirty="0" smtClean="0"/>
+              <a:t>Comment mettre à profit le </a:t>
+            </a:r>
+            <a:r>
+              <a:rPr lang="fr-FR" dirty="0" err="1" smtClean="0"/>
+              <a:t>sampling</a:t>
+            </a:r>
+            <a:r>
+              <a:rPr lang="fr-FR" dirty="0" smtClean="0"/>
+              <a:t> pour permettre l’apprentissage? (cf. papier </a:t>
+            </a:r>
+            <a:r>
+              <a:rPr lang="fr-FR" dirty="0" err="1" smtClean="0"/>
+              <a:t>Sampled</a:t>
+            </a:r>
+            <a:r>
+              <a:rPr lang="fr-FR" dirty="0" smtClean="0"/>
+              <a:t> Policy Gradient)</a:t>
+            </a:r>
+          </a:p>
+          <a:p>
+            <a:r>
+              <a:rPr lang="mr-IN" dirty="0" smtClean="0"/>
+              <a:t>…</a:t>
+            </a:r>
+            <a:endParaRPr lang="fr-FR" dirty="0" smtClean="0"/>
+          </a:p>
+          <a:p>
+            <a:pPr>
+              <a:buFont typeface="Symbol" charset="2"/>
+              <a:buChar char="Þ"/>
+            </a:pPr>
+            <a:endParaRPr lang="fr-FR" dirty="0" smtClean="0"/>
+          </a:p>
+          <a:p>
+            <a:endParaRPr lang="fr-FR" dirty="0"/>
+          </a:p>
+        </p:txBody>
+      </p:sp>
+    </p:spTree>
+    <p:extLst>
+      <p:ext uri="{BB962C8B-B14F-4D97-AF65-F5344CB8AC3E}">
+        <p14:creationId xmlns:p14="http://schemas.microsoft.com/office/powerpoint/2010/main" val="1825442646"/>
+      </p:ext>
+    </p:extLst>
+  </p:cSld>
+  <p:clrMapOvr>
+    <a:masterClrMapping/>
+  </p:clrMapOvr>
+  <p:timing>
+    <p:tnLst>
+      <p:par>
+        <p:cTn id="1" dur="indefinite" restart="never" nodeType="tmRoot"/>
+      </p:par>
+    </p:tnLst>
+  </p:timing>
+</p:sld>
+</file>
+
+<file path=ppt/slides/slide2.xml><?xml version="1.0" encoding="utf-8"?>
+<p:sld xmlns:a="http://schemas.openxmlformats.org/drawingml/2006/main" xmlns:r="http://schemas.openxmlformats.org/officeDocument/2006/relationships" xmlns:p="http://schemas.openxmlformats.org/presentationml/2006/main">
+  <p:cSld>
+    <p:spTree>
+      <p:nvGrpSpPr>
+        <p:cNvPr id="1" name=""/>
+        <p:cNvGrpSpPr/>
+        <p:nvPr/>
+      </p:nvGrpSpPr>
+      <p:grpSpPr>
+        <a:xfrm>
+          <a:off x="0" y="0"/>
+          <a:ext cx="0" cy="0"/>
+          <a:chOff x="0" y="0"/>
+          <a:chExt cx="0" cy="0"/>
+        </a:xfrm>
+      </p:grpSpPr>
+      <p:sp>
+        <p:nvSpPr>
+          <p:cNvPr id="2" name="Titre 1"/>
+          <p:cNvSpPr>
+            <a:spLocks noGrp="1"/>
+          </p:cNvSpPr>
+          <p:nvPr>
+            <p:ph type="title"/>
+          </p:nvPr>
+        </p:nvSpPr>
+        <p:spPr/>
+        <p:txBody>
+          <a:bodyPr/>
+          <a:lstStyle/>
+          <a:p>
+            <a:r>
+              <a:rPr lang="fr-FR" dirty="0" smtClean="0"/>
+              <a:t>Introduction</a:t>
+            </a:r>
+            <a:endParaRPr lang="fr-FR" dirty="0"/>
+          </a:p>
+        </p:txBody>
+      </p:sp>
+      <p:sp>
+        <p:nvSpPr>
+          <p:cNvPr id="3" name="Espace réservé du contenu 2"/>
+          <p:cNvSpPr>
+            <a:spLocks noGrp="1"/>
+          </p:cNvSpPr>
+          <p:nvPr>
+            <p:ph idx="1"/>
+          </p:nvPr>
+        </p:nvSpPr>
+        <p:spPr>
+          <a:xfrm>
+            <a:off x="168729" y="894896"/>
+            <a:ext cx="10515600" cy="483169"/>
+          </a:xfrm>
+        </p:spPr>
+        <p:txBody>
+          <a:bodyPr/>
+          <a:lstStyle/>
+          <a:p>
+            <a:r>
+              <a:rPr lang="fr-FR" smtClean="0"/>
+              <a:t>Expérience </a:t>
+            </a:r>
+            <a:r>
+              <a:rPr lang="fr-FR" dirty="0" smtClean="0"/>
+              <a:t>:</a:t>
+            </a:r>
+          </a:p>
+        </p:txBody>
+      </p:sp>
+      <p:pic>
+        <p:nvPicPr>
+          <p:cNvPr id="5" name="Image 4"/>
+          <p:cNvPicPr>
+            <a:picLocks noChangeAspect="1"/>
+          </p:cNvPicPr>
+          <p:nvPr/>
+        </p:nvPicPr>
+        <p:blipFill>
+          <a:blip r:embed="rId2"/>
+          <a:stretch>
+            <a:fillRect/>
+          </a:stretch>
+        </p:blipFill>
+        <p:spPr>
+          <a:xfrm>
+            <a:off x="4385130" y="1475626"/>
+            <a:ext cx="4069565" cy="1800000"/>
+          </a:xfrm>
+          <a:prstGeom prst="rect">
+            <a:avLst/>
+          </a:prstGeom>
+        </p:spPr>
+      </p:pic>
+      <p:pic>
+        <p:nvPicPr>
+          <p:cNvPr id="7" name="Image 6"/>
+          <p:cNvPicPr>
+            <a:picLocks noChangeAspect="1"/>
+          </p:cNvPicPr>
+          <p:nvPr/>
+        </p:nvPicPr>
+        <p:blipFill>
+          <a:blip r:embed="rId3"/>
+          <a:stretch>
+            <a:fillRect/>
+          </a:stretch>
+        </p:blipFill>
+        <p:spPr>
+          <a:xfrm>
+            <a:off x="4385130" y="4346234"/>
+            <a:ext cx="4190323" cy="1800000"/>
+          </a:xfrm>
+          <a:prstGeom prst="rect">
+            <a:avLst/>
+          </a:prstGeom>
+        </p:spPr>
+      </p:pic>
+      <p:sp>
+        <p:nvSpPr>
+          <p:cNvPr id="8" name="ZoneTexte 7"/>
+          <p:cNvSpPr txBox="1"/>
+          <p:nvPr/>
+        </p:nvSpPr>
+        <p:spPr>
+          <a:xfrm>
+            <a:off x="1409694" y="2052461"/>
+            <a:ext cx="1612621" cy="646331"/>
+          </a:xfrm>
+          <a:prstGeom prst="rect">
+            <a:avLst/>
+          </a:prstGeom>
+          <a:noFill/>
+        </p:spPr>
+        <p:txBody>
+          <a:bodyPr wrap="none" rtlCol="0">
+            <a:spAutoFit/>
+          </a:bodyPr>
+          <a:lstStyle/>
+          <a:p>
+            <a:r>
+              <a:rPr lang="fr-FR" dirty="0" smtClean="0"/>
+              <a:t>DDPG standard</a:t>
+            </a:r>
+          </a:p>
+          <a:p>
+            <a:r>
+              <a:rPr lang="fr-FR" dirty="0" smtClean="0"/>
+              <a:t>« on </a:t>
+            </a:r>
+            <a:r>
+              <a:rPr lang="fr-FR" dirty="0" err="1" smtClean="0"/>
+              <a:t>policy</a:t>
+            </a:r>
+            <a:r>
+              <a:rPr lang="fr-FR" dirty="0" smtClean="0"/>
+              <a:t> » </a:t>
+            </a:r>
+            <a:endParaRPr lang="fr-FR" dirty="0"/>
+          </a:p>
+        </p:txBody>
+      </p:sp>
+      <p:sp>
+        <p:nvSpPr>
+          <p:cNvPr id="9" name="ZoneTexte 8"/>
+          <p:cNvSpPr txBox="1"/>
+          <p:nvPr/>
+        </p:nvSpPr>
+        <p:spPr>
+          <a:xfrm>
+            <a:off x="1409693" y="5061568"/>
+            <a:ext cx="1717073" cy="369332"/>
+          </a:xfrm>
+          <a:prstGeom prst="rect">
+            <a:avLst/>
+          </a:prstGeom>
+          <a:noFill/>
+        </p:spPr>
+        <p:txBody>
+          <a:bodyPr wrap="none" rtlCol="0">
+            <a:spAutoFit/>
+          </a:bodyPr>
+          <a:lstStyle/>
+          <a:p>
+            <a:r>
+              <a:rPr lang="fr-FR" dirty="0" smtClean="0"/>
+              <a:t>DDPG off-</a:t>
+            </a:r>
+            <a:r>
+              <a:rPr lang="fr-FR" dirty="0" err="1" smtClean="0"/>
+              <a:t>policy</a:t>
+            </a:r>
+            <a:r>
+              <a:rPr lang="fr-FR" dirty="0" smtClean="0"/>
+              <a:t> </a:t>
+            </a:r>
+            <a:endParaRPr lang="fr-FR" dirty="0"/>
+          </a:p>
+        </p:txBody>
+      </p:sp>
+      <p:cxnSp>
+        <p:nvCxnSpPr>
+          <p:cNvPr id="11" name="Connecteur droit 10"/>
+          <p:cNvCxnSpPr/>
+          <p:nvPr/>
+        </p:nvCxnSpPr>
+        <p:spPr>
+          <a:xfrm flipV="1">
+            <a:off x="653142" y="3708184"/>
+            <a:ext cx="11136086" cy="65314"/>
+          </a:xfrm>
+          <a:prstGeom prst="line">
+            <a:avLst/>
+          </a:prstGeom>
+          <a:ln>
+            <a:solidFill>
+              <a:schemeClr val="tx1"/>
+            </a:solidFill>
+            <a:prstDash val="sysDash"/>
+          </a:ln>
+        </p:spPr>
+        <p:style>
+          <a:lnRef idx="1">
+            <a:schemeClr val="accent1"/>
+          </a:lnRef>
+          <a:fillRef idx="0">
+            <a:schemeClr val="accent1"/>
+          </a:fillRef>
+          <a:effectRef idx="0">
+            <a:schemeClr val="accent1"/>
+          </a:effectRef>
+          <a:fontRef idx="minor">
+            <a:schemeClr val="tx1"/>
+          </a:fontRef>
+        </p:style>
+      </p:cxnSp>
+    </p:spTree>
+    <p:extLst>
+      <p:ext uri="{BB962C8B-B14F-4D97-AF65-F5344CB8AC3E}">
+        <p14:creationId xmlns:p14="http://schemas.microsoft.com/office/powerpoint/2010/main" val="577158550"/>
+      </p:ext>
+    </p:extLst>
+  </p:cSld>
+  <p:clrMapOvr>
+    <a:masterClrMapping/>
+  </p:clrMapOvr>
+  <p:timing>
+    <p:tnLst>
+      <p:par>
+        <p:cTn id="1" dur="indefinite" restart="never" nodeType="tmRoot"/>
+      </p:par>
+    </p:tnLst>
+  </p:timing>
+</p:sld>
+</file>
+
+<file path=ppt/slides/slide3.xml><?xml version="1.0" encoding="utf-8"?>
+<p:sld xmlns:a="http://schemas.openxmlformats.org/drawingml/2006/main" xmlns:r="http://schemas.openxmlformats.org/officeDocument/2006/relationships" xmlns:p="http://schemas.openxmlformats.org/presentationml/2006/main">
+  <p:cSld>
+    <p:spTree>
+      <p:nvGrpSpPr>
+        <p:cNvPr id="1" name=""/>
+        <p:cNvGrpSpPr/>
+        <p:nvPr/>
+      </p:nvGrpSpPr>
+      <p:grpSpPr>
+        <a:xfrm>
+          <a:off x="0" y="0"/>
+          <a:ext cx="0" cy="0"/>
+          <a:chOff x="0" y="0"/>
+          <a:chExt cx="0" cy="0"/>
+        </a:xfrm>
+      </p:grpSpPr>
+      <p:sp>
+        <p:nvSpPr>
+          <p:cNvPr id="2" name="Titre 1"/>
+          <p:cNvSpPr>
+            <a:spLocks noGrp="1"/>
+          </p:cNvSpPr>
+          <p:nvPr>
+            <p:ph type="title"/>
+          </p:nvPr>
+        </p:nvSpPr>
+        <p:spPr/>
+        <p:txBody>
+          <a:bodyPr/>
+          <a:lstStyle/>
+          <a:p>
+            <a:r>
+              <a:rPr lang="fr-FR" dirty="0" smtClean="0"/>
+              <a:t>Introduction</a:t>
+            </a:r>
+            <a:endParaRPr lang="fr-FR" dirty="0"/>
+          </a:p>
+        </p:txBody>
+      </p:sp>
+      <p:pic>
+        <p:nvPicPr>
+          <p:cNvPr id="7" name="Image 6"/>
+          <p:cNvPicPr>
+            <a:picLocks noChangeAspect="1"/>
+          </p:cNvPicPr>
+          <p:nvPr/>
+        </p:nvPicPr>
+        <p:blipFill>
+          <a:blip r:embed="rId2"/>
+          <a:stretch>
+            <a:fillRect/>
+          </a:stretch>
+        </p:blipFill>
+        <p:spPr>
+          <a:xfrm>
+            <a:off x="4336145" y="1378065"/>
+            <a:ext cx="4190323" cy="1800000"/>
+          </a:xfrm>
+          <a:prstGeom prst="rect">
+            <a:avLst/>
+          </a:prstGeom>
+        </p:spPr>
+      </p:pic>
+      <p:sp>
+        <p:nvSpPr>
+          <p:cNvPr id="9" name="ZoneTexte 8"/>
+          <p:cNvSpPr txBox="1"/>
+          <p:nvPr/>
+        </p:nvSpPr>
+        <p:spPr>
+          <a:xfrm>
+            <a:off x="1360708" y="2093399"/>
+            <a:ext cx="1717073" cy="369332"/>
+          </a:xfrm>
+          <a:prstGeom prst="rect">
+            <a:avLst/>
+          </a:prstGeom>
+          <a:noFill/>
+        </p:spPr>
+        <p:txBody>
+          <a:bodyPr wrap="none" rtlCol="0">
+            <a:spAutoFit/>
+          </a:bodyPr>
+          <a:lstStyle/>
+          <a:p>
+            <a:r>
+              <a:rPr lang="fr-FR" dirty="0" smtClean="0"/>
+              <a:t>DDPG off-</a:t>
+            </a:r>
+            <a:r>
+              <a:rPr lang="fr-FR" dirty="0" err="1" smtClean="0"/>
+              <a:t>policy</a:t>
+            </a:r>
+            <a:r>
+              <a:rPr lang="fr-FR" dirty="0" smtClean="0"/>
+              <a:t> </a:t>
+            </a:r>
+            <a:endParaRPr lang="fr-FR" dirty="0"/>
+          </a:p>
+        </p:txBody>
+      </p:sp>
+      <p:sp>
+        <p:nvSpPr>
+          <p:cNvPr id="10" name="Espace réservé du contenu 2"/>
+          <p:cNvSpPr txBox="1">
+            <a:spLocks/>
+          </p:cNvSpPr>
+          <p:nvPr/>
+        </p:nvSpPr>
+        <p:spPr>
+          <a:xfrm>
+            <a:off x="674915" y="3837672"/>
+            <a:ext cx="10515600" cy="1813353"/>
+          </a:xfrm>
+          <a:prstGeom prst="rect">
+            <a:avLst/>
+          </a:prstGeom>
+        </p:spPr>
+        <p:txBody>
+          <a:bodyPr vert="horz" lIns="91440" tIns="45720" rIns="91440" bIns="45720" rtlCol="0">
+            <a:normAutofit/>
+          </a:bodyPr>
+          <a:lstStyle>
+            <a:lvl1pPr marL="228600" indent="-228600" algn="l" defTabSz="914400" rtl="0" eaLnBrk="1" latinLnBrk="0" hangingPunct="1">
+              <a:lnSpc>
+                <a:spcPct val="90000"/>
+              </a:lnSpc>
+              <a:spcBef>
+                <a:spcPts val="1000"/>
+              </a:spcBef>
+              <a:buFont typeface="Arial"/>
+              <a:buChar char="•"/>
+              <a:defRPr sz="2000" kern="1200">
+                <a:solidFill>
+                  <a:schemeClr val="tx1"/>
+                </a:solidFill>
+                <a:latin typeface="+mn-lt"/>
+                <a:ea typeface="+mn-ea"/>
+                <a:cs typeface="+mn-cs"/>
+              </a:defRPr>
+            </a:lvl1pPr>
+            <a:lvl2pPr marL="685800" indent="-228600" algn="l" defTabSz="914400" rtl="0" eaLnBrk="1" latinLnBrk="0" hangingPunct="1">
+              <a:lnSpc>
+                <a:spcPct val="90000"/>
+              </a:lnSpc>
+              <a:spcBef>
+                <a:spcPts val="500"/>
+              </a:spcBef>
+              <a:buFont typeface="Arial"/>
+              <a:buChar char="•"/>
+              <a:defRPr sz="1800" kern="1200">
+                <a:solidFill>
+                  <a:schemeClr val="tx1"/>
+                </a:solidFill>
+                <a:latin typeface="+mn-lt"/>
+                <a:ea typeface="+mn-ea"/>
+                <a:cs typeface="+mn-cs"/>
+              </a:defRPr>
+            </a:lvl2pPr>
+            <a:lvl3pPr marL="1143000" indent="-228600" algn="l" defTabSz="914400" rtl="0" eaLnBrk="1" latinLnBrk="0" hangingPunct="1">
+              <a:lnSpc>
+                <a:spcPct val="90000"/>
+              </a:lnSpc>
+              <a:spcBef>
+                <a:spcPts val="500"/>
+              </a:spcBef>
+              <a:buFont typeface="Arial"/>
+              <a:buChar char="•"/>
+              <a:defRPr sz="1600" kern="1200">
+                <a:solidFill>
+                  <a:schemeClr val="tx1"/>
+                </a:solidFill>
+                <a:latin typeface="+mn-lt"/>
+                <a:ea typeface="+mn-ea"/>
+                <a:cs typeface="+mn-cs"/>
+              </a:defRPr>
+            </a:lvl3pPr>
+            <a:lvl4pPr marL="1600200" indent="-228600" algn="l" defTabSz="914400" rtl="0" eaLnBrk="1" latinLnBrk="0" hangingPunct="1">
+              <a:lnSpc>
+                <a:spcPct val="90000"/>
+              </a:lnSpc>
+              <a:spcBef>
+                <a:spcPts val="500"/>
+              </a:spcBef>
+              <a:buFont typeface="Arial"/>
+              <a:buChar char="•"/>
+              <a:defRPr sz="1400" kern="1200">
+                <a:solidFill>
+                  <a:schemeClr val="tx1"/>
+                </a:solidFill>
+                <a:latin typeface="+mn-lt"/>
+                <a:ea typeface="+mn-ea"/>
+                <a:cs typeface="+mn-cs"/>
+              </a:defRPr>
+            </a:lvl4pPr>
+            <a:lvl5pPr marL="2057400" indent="-228600" algn="l" defTabSz="914400" rtl="0" eaLnBrk="1" latinLnBrk="0" hangingPunct="1">
+              <a:lnSpc>
+                <a:spcPct val="90000"/>
+              </a:lnSpc>
+              <a:spcBef>
+                <a:spcPts val="500"/>
+              </a:spcBef>
+              <a:buFont typeface="Arial"/>
+              <a:buChar char="•"/>
+              <a:defRPr sz="1400" kern="1200">
+                <a:solidFill>
+                  <a:schemeClr val="tx1"/>
+                </a:solidFill>
+                <a:latin typeface="+mn-lt"/>
+                <a:ea typeface="+mn-ea"/>
+                <a:cs typeface="+mn-cs"/>
+              </a:defRPr>
+            </a:lvl5pPr>
+            <a:lvl6pPr marL="2514600" indent="-228600" algn="l" defTabSz="914400" rtl="0" eaLnBrk="1" latinLnBrk="0" hangingPunct="1">
+              <a:lnSpc>
+                <a:spcPct val="90000"/>
+              </a:lnSpc>
+              <a:spcBef>
+                <a:spcPts val="500"/>
+              </a:spcBef>
+              <a:buFont typeface="Arial"/>
+              <a:buChar char="•"/>
+              <a:defRPr sz="1800" kern="1200">
+                <a:solidFill>
+                  <a:schemeClr val="tx1"/>
+                </a:solidFill>
+                <a:latin typeface="+mn-lt"/>
+                <a:ea typeface="+mn-ea"/>
+                <a:cs typeface="+mn-cs"/>
+              </a:defRPr>
+            </a:lvl6pPr>
+            <a:lvl7pPr marL="2971800" indent="-228600" algn="l" defTabSz="914400" rtl="0" eaLnBrk="1" latinLnBrk="0" hangingPunct="1">
+              <a:lnSpc>
+                <a:spcPct val="90000"/>
+              </a:lnSpc>
+              <a:spcBef>
+                <a:spcPts val="500"/>
+              </a:spcBef>
+              <a:buFont typeface="Arial"/>
+              <a:buChar char="•"/>
+              <a:defRPr sz="1800" kern="1200">
+                <a:solidFill>
+                  <a:schemeClr val="tx1"/>
+                </a:solidFill>
+                <a:latin typeface="+mn-lt"/>
+                <a:ea typeface="+mn-ea"/>
+                <a:cs typeface="+mn-cs"/>
+              </a:defRPr>
+            </a:lvl7pPr>
+            <a:lvl8pPr marL="3429000" indent="-228600" algn="l" defTabSz="914400" rtl="0" eaLnBrk="1" latinLnBrk="0" hangingPunct="1">
+              <a:lnSpc>
+                <a:spcPct val="90000"/>
+              </a:lnSpc>
+              <a:spcBef>
+                <a:spcPts val="500"/>
+              </a:spcBef>
+              <a:buFont typeface="Arial"/>
+              <a:buChar char="•"/>
+              <a:defRPr sz="1800" kern="1200">
+                <a:solidFill>
+                  <a:schemeClr val="tx1"/>
+                </a:solidFill>
+                <a:latin typeface="+mn-lt"/>
+                <a:ea typeface="+mn-ea"/>
+                <a:cs typeface="+mn-cs"/>
+              </a:defRPr>
+            </a:lvl8pPr>
+            <a:lvl9pPr marL="3886200" indent="-228600" algn="l" defTabSz="914400" rtl="0" eaLnBrk="1" latinLnBrk="0" hangingPunct="1">
+              <a:lnSpc>
+                <a:spcPct val="90000"/>
+              </a:lnSpc>
+              <a:spcBef>
+                <a:spcPts val="500"/>
+              </a:spcBef>
+              <a:buFont typeface="Arial"/>
+              <a:buChar char="•"/>
+              <a:defRPr sz="1800" kern="1200">
+                <a:solidFill>
+                  <a:schemeClr val="tx1"/>
+                </a:solidFill>
+                <a:latin typeface="+mn-lt"/>
+                <a:ea typeface="+mn-ea"/>
+                <a:cs typeface="+mn-cs"/>
+              </a:defRPr>
+            </a:lvl9pPr>
+          </a:lstStyle>
+          <a:p>
             <a:pPr marL="0" indent="0">
               <a:buNone/>
             </a:pPr>
@@ -4472,7 +4992,6 @@
               <a:rPr lang="fr-FR" sz="2400" dirty="0" smtClean="0"/>
               <a:t>Tester la convergence de la politique vers une politique optimale </a:t>
             </a:r>
-            <a:endParaRPr lang="fr-FR" sz="2400" dirty="0" smtClean="0"/>
           </a:p>
         </p:txBody>
       </p:sp>
@@ -4647,36 +5166,6 @@
           <a:chExt cx="0" cy="0"/>
         </a:xfrm>
       </p:grpSpPr>
-      <p:pic>
-        <p:nvPicPr>
-          <p:cNvPr id="7" name="Image 6"/>
-          <p:cNvPicPr>
-            <a:picLocks noChangeAspect="1"/>
-          </p:cNvPicPr>
-          <p:nvPr/>
-        </p:nvPicPr>
-        <p:blipFill>
-          <a:blip r:embed="rId2">
-            <a:extLst>
-              <a:ext uri="{28A0092B-C50C-407E-A947-70E740481C1C}">
-                <a14:useLocalDpi xmlns:a14="http://schemas.microsoft.com/office/drawing/2010/main" val="0"/>
-              </a:ext>
-            </a:extLst>
-          </a:blip>
-          <a:stretch>
-            <a:fillRect/>
-          </a:stretch>
-        </p:blipFill>
-        <p:spPr>
-          <a:xfrm>
-            <a:off x="2632373" y="1231327"/>
-            <a:ext cx="7066800" cy="5300100"/>
-          </a:xfrm>
-          <a:prstGeom prst="rect">
-            <a:avLst/>
-          </a:prstGeom>
-        </p:spPr>
-      </p:pic>
       <p:sp>
         <p:nvSpPr>
           <p:cNvPr id="2" name="Titre 1"/>
@@ -4742,6 +5231,133 @@
           </a:p>
         </p:txBody>
       </p:sp>
+      <p:grpSp>
+        <p:nvGrpSpPr>
+          <p:cNvPr id="5" name="Grouper 4"/>
+          <p:cNvGrpSpPr/>
+          <p:nvPr/>
+        </p:nvGrpSpPr>
+        <p:grpSpPr>
+          <a:xfrm>
+            <a:off x="2632373" y="1240381"/>
+            <a:ext cx="7066800" cy="5300100"/>
+            <a:chOff x="2632373" y="1240381"/>
+            <a:chExt cx="7066800" cy="5300100"/>
+          </a:xfrm>
+        </p:grpSpPr>
+        <p:pic>
+          <p:nvPicPr>
+            <p:cNvPr id="7" name="Image 6"/>
+            <p:cNvPicPr>
+              <a:picLocks noChangeAspect="1"/>
+            </p:cNvPicPr>
+            <p:nvPr/>
+          </p:nvPicPr>
+          <p:blipFill>
+            <a:blip r:embed="rId2">
+              <a:extLst>
+                <a:ext uri="{28A0092B-C50C-407E-A947-70E740481C1C}">
+                  <a14:useLocalDpi xmlns:a14="http://schemas.microsoft.com/office/drawing/2010/main" val="0"/>
+                </a:ext>
+              </a:extLst>
+            </a:blip>
+            <a:stretch>
+              <a:fillRect/>
+            </a:stretch>
+          </p:blipFill>
+          <p:spPr>
+            <a:xfrm>
+              <a:off x="2632373" y="1240381"/>
+              <a:ext cx="7066800" cy="5300100"/>
+            </a:xfrm>
+            <a:prstGeom prst="rect">
+              <a:avLst/>
+            </a:prstGeom>
+          </p:spPr>
+        </p:pic>
+        <p:sp>
+          <p:nvSpPr>
+            <p:cNvPr id="4" name="Rectangle 3"/>
+            <p:cNvSpPr/>
+            <p:nvPr/>
+          </p:nvSpPr>
+          <p:spPr>
+            <a:xfrm>
+              <a:off x="8499697" y="2580238"/>
+              <a:ext cx="381754" cy="977774"/>
+            </a:xfrm>
+            <a:prstGeom prst="rect">
+              <a:avLst/>
+            </a:prstGeom>
+            <a:ln>
+              <a:noFill/>
+            </a:ln>
+          </p:spPr>
+          <p:style>
+            <a:lnRef idx="2">
+              <a:schemeClr val="accent6"/>
+            </a:lnRef>
+            <a:fillRef idx="1">
+              <a:schemeClr val="lt1"/>
+            </a:fillRef>
+            <a:effectRef idx="0">
+              <a:schemeClr val="accent6"/>
+            </a:effectRef>
+            <a:fontRef idx="minor">
+              <a:schemeClr val="dk1"/>
+            </a:fontRef>
+          </p:style>
+          <p:txBody>
+            <a:bodyPr rtlCol="0" anchor="ctr"/>
+            <a:lstStyle/>
+            <a:p>
+              <a:pPr algn="ctr"/>
+              <a:endParaRPr lang="fr-FR"/>
+            </a:p>
+          </p:txBody>
+        </p:sp>
+        <p:sp>
+          <p:nvSpPr>
+            <p:cNvPr id="6" name="Rectangle 5"/>
+            <p:cNvSpPr/>
+            <p:nvPr/>
+          </p:nvSpPr>
+          <p:spPr>
+            <a:xfrm>
+              <a:off x="8521841" y="4444898"/>
+              <a:ext cx="363648" cy="977774"/>
+            </a:xfrm>
+            <a:prstGeom prst="rect">
+              <a:avLst/>
+            </a:prstGeom>
+            <a:ln>
+              <a:noFill/>
+            </a:ln>
+          </p:spPr>
+          <p:style>
+            <a:lnRef idx="2">
+              <a:schemeClr val="accent6"/>
+            </a:lnRef>
+            <a:fillRef idx="1">
+              <a:schemeClr val="lt1"/>
+            </a:fillRef>
+            <a:effectRef idx="0">
+              <a:schemeClr val="accent6"/>
+            </a:effectRef>
+            <a:fontRef idx="minor">
+              <a:schemeClr val="dk1"/>
+            </a:fontRef>
+          </p:style>
+          <p:txBody>
+            <a:bodyPr rtlCol="0" anchor="ctr"/>
+            <a:lstStyle/>
+            <a:p>
+              <a:pPr algn="ctr"/>
+              <a:endParaRPr lang="fr-FR"/>
+            </a:p>
+          </p:txBody>
+        </p:sp>
+      </p:grpSp>
     </p:spTree>
     <p:extLst>
       <p:ext uri="{BB962C8B-B14F-4D97-AF65-F5344CB8AC3E}">

</xml_diff>